<commit_message>
Added new files and updates
</commit_message>
<xml_diff>
--- a/ppt_1.1.pptx
+++ b/ppt_1.1.pptx
@@ -4919,7 +4919,15 @@
                 <a:pPr lvl="1"/>
                 <a:r>
                   <a:rPr lang="en-IN" sz="2000" dirty="0"/>
-                  <a:t>Similar to AIC, but applies stronger penalty to the complexity ( no. of model parameters).</a:t>
+                  <a:t>Similar to AIC, but applies </a:t>
+                </a:r>
+                <a:r>
+                  <a:rPr lang="en-IN" sz="2000" b="1" dirty="0"/>
+                  <a:t>stronger penalty </a:t>
+                </a:r>
+                <a:r>
+                  <a:rPr lang="en-IN" sz="2000" dirty="0"/>
+                  <a:t>to the complexity ( no. of model parameters).</a:t>
                 </a:r>
               </a:p>
               <a:p>
@@ -5062,7 +5070,7 @@
               <a:blipFill>
                 <a:blip r:embed="rId2"/>
                 <a:stretch>
-                  <a:fillRect l="-812" t="-1675" r="-174"/>
+                  <a:fillRect l="-812" t="-1675"/>
                 </a:stretch>
               </a:blipFill>
             </p:spPr>
@@ -5735,6 +5743,55 @@
           </a:p>
         </p:txBody>
       </p:sp>
+      <p:sp>
+        <p:nvSpPr>
+          <p:cNvPr id="15" name="TextBox 14">
+            <a:extLst>
+              <a:ext uri="{FF2B5EF4-FFF2-40B4-BE49-F238E27FC236}">
+                <a16:creationId xmlns:a16="http://schemas.microsoft.com/office/drawing/2014/main" id="{77FB12BB-B7F2-603B-7B30-BE41387CDBEA}"/>
+              </a:ext>
+            </a:extLst>
+          </p:cNvPr>
+          <p:cNvSpPr txBox="1"/>
+          <p:nvPr/>
+        </p:nvSpPr>
+        <p:spPr>
+          <a:xfrm>
+            <a:off x="457200" y="5438274"/>
+            <a:ext cx="10828421" cy="923330"/>
+          </a:xfrm>
+          <a:prstGeom prst="rect">
+            <a:avLst/>
+          </a:prstGeom>
+          <a:noFill/>
+        </p:spPr>
+        <p:txBody>
+          <a:bodyPr wrap="square" rtlCol="0">
+            <a:spAutoFit/>
+          </a:bodyPr>
+          <a:lstStyle/>
+          <a:p>
+            <a:pPr marL="285750" indent="-285750">
+              <a:buFont typeface="Arial" panose="020B0604020202020204" pitchFamily="34" charset="0"/>
+              <a:buChar char="•"/>
+            </a:pPr>
+            <a:r>
+              <a:rPr lang="en-IN" dirty="0"/>
+              <a:t>The chart depicts the upward growth of stock prices, with some patches of downward movement in between.</a:t>
+            </a:r>
+          </a:p>
+          <a:p>
+            <a:pPr marL="285750" indent="-285750">
+              <a:buFont typeface="Arial" panose="020B0604020202020204" pitchFamily="34" charset="0"/>
+              <a:buChar char="•"/>
+            </a:pPr>
+            <a:r>
+              <a:rPr lang="en-IN" dirty="0"/>
+              <a:t>The box plot shows the lack of any outliers in the data.</a:t>
+            </a:r>
+          </a:p>
+        </p:txBody>
+      </p:sp>
     </p:spTree>
     <p:extLst>
       <p:ext uri="{BB962C8B-B14F-4D97-AF65-F5344CB8AC3E}">
@@ -6579,10 +6636,10 @@
           <a:p>
             <a:pPr algn="ctr"/>
             <a:r>
-              <a:rPr lang="en-US" b="1"/>
+              <a:rPr lang="en-US" b="1" dirty="0"/>
               <a:t>Introduction</a:t>
             </a:r>
-            <a:endParaRPr lang="en-IN" b="1"/>
+            <a:endParaRPr lang="en-IN" b="1" dirty="0"/>
           </a:p>
         </p:txBody>
       </p:sp>
@@ -6613,14 +6670,14 @@
           <a:lstStyle/>
           <a:p>
             <a:r>
-              <a:rPr lang="en-IN" b="1"/>
+              <a:rPr lang="en-IN" b="1" dirty="0"/>
               <a:t>Why Stock Prices Defy Simple Forecasting?</a:t>
             </a:r>
           </a:p>
           <a:p>
             <a:pPr lvl="1"/>
             <a:r>
-              <a:rPr lang="en-IN"/>
+              <a:rPr lang="en-IN" sz="2000" dirty="0"/>
               <a:t>Financial markets are complex adaptive systems shaped by</a:t>
             </a:r>
           </a:p>
@@ -6630,7 +6687,7 @@
               <a:buChar char="Ø"/>
             </a:pPr>
             <a:r>
-              <a:rPr lang="en-IN"/>
+              <a:rPr lang="en-IN" dirty="0"/>
               <a:t>Market Psychology</a:t>
             </a:r>
           </a:p>
@@ -6640,7 +6697,7 @@
               <a:buChar char="Ø"/>
             </a:pPr>
             <a:r>
-              <a:rPr lang="en-IN"/>
+              <a:rPr lang="en-IN" dirty="0"/>
               <a:t>Macroeconomic Shocks</a:t>
             </a:r>
           </a:p>
@@ -6650,14 +6707,14 @@
               <a:buChar char="Ø"/>
             </a:pPr>
             <a:r>
-              <a:rPr lang="en-IN"/>
+              <a:rPr lang="en-IN" dirty="0"/>
               <a:t>Microstructural Noise.</a:t>
             </a:r>
           </a:p>
           <a:p>
             <a:pPr lvl="1"/>
             <a:r>
-              <a:rPr lang="en-IN"/>
+              <a:rPr lang="en-IN" sz="2000" dirty="0"/>
               <a:t>Traditional methods, such as ARIMA, don’t capture the complex patterns of the series. </a:t>
             </a:r>
           </a:p>
@@ -6666,13 +6723,13 @@
               <a:buFont typeface="Wingdings" panose="05000000000000000000" pitchFamily="2" charset="2"/>
               <a:buChar char="Ø"/>
             </a:pPr>
-            <a:endParaRPr lang="en-IN"/>
+            <a:endParaRPr lang="en-IN" dirty="0"/>
           </a:p>
           <a:p>
             <a:pPr marL="914400" lvl="2" indent="0">
               <a:buNone/>
             </a:pPr>
-            <a:endParaRPr lang="en-IN"/>
+            <a:endParaRPr lang="en-IN" dirty="0"/>
           </a:p>
         </p:txBody>
       </p:sp>
@@ -6703,34 +6760,34 @@
           <a:lstStyle/>
           <a:p>
             <a:r>
-              <a:rPr lang="en-IN" b="1"/>
+              <a:rPr lang="en-IN" b="1" dirty="0"/>
               <a:t>The Hybrid Advantage</a:t>
             </a:r>
           </a:p>
           <a:p>
             <a:pPr lvl="1"/>
             <a:r>
-              <a:rPr lang="en-IN"/>
+              <a:rPr lang="en-IN" sz="2000" dirty="0"/>
               <a:t>With the combination of the traditional methods and the deep learning methods, we can create a model that forecasts better than either one, without the danger of overfitting.</a:t>
             </a:r>
           </a:p>
           <a:p>
             <a:pPr lvl="1"/>
             <a:r>
-              <a:rPr lang="en-IN"/>
+              <a:rPr lang="en-IN" dirty="0"/>
               <a:t>Real World Impact:-</a:t>
             </a:r>
           </a:p>
           <a:p>
             <a:pPr lvl="2"/>
             <a:r>
-              <a:rPr lang="en-IN"/>
+              <a:rPr lang="en-IN" dirty="0"/>
               <a:t>Many hedge fund management firms employ the hybrid method.</a:t>
             </a:r>
           </a:p>
           <a:p>
             <a:pPr lvl="1"/>
-            <a:endParaRPr lang="en-IN"/>
+            <a:endParaRPr lang="en-IN" dirty="0"/>
           </a:p>
         </p:txBody>
       </p:sp>
@@ -8051,33 +8108,33 @@
                     <m:sSubSup>
                       <m:sSubSupPr>
                         <m:ctrlPr>
-                          <a:rPr lang="en-IN" sz="2000" b="0" i="1" smtClean="0">
+                          <a:rPr lang="en-IN" sz="2000" b="1" i="1" smtClean="0">
                             <a:latin typeface="Cambria Math" panose="02040503050406030204" pitchFamily="18" charset="0"/>
                           </a:rPr>
                         </m:ctrlPr>
                       </m:sSubSupPr>
                       <m:e>
                         <m:r>
-                          <a:rPr lang="en-IN" sz="2000" b="0" i="1" smtClean="0">
+                          <a:rPr lang="en-IN" sz="2000" b="1" i="1" smtClean="0">
                             <a:latin typeface="Cambria Math" panose="02040503050406030204" pitchFamily="18" charset="0"/>
                           </a:rPr>
-                          <m:t>𝜒</m:t>
+                          <m:t>𝝌</m:t>
                         </m:r>
                       </m:e>
                       <m:sub>
                         <m:r>
-                          <a:rPr lang="en-IN" sz="2000" b="0" i="1" smtClean="0">
+                          <a:rPr lang="en-IN" sz="2000" b="1" i="1" smtClean="0">
                             <a:latin typeface="Cambria Math" panose="02040503050406030204" pitchFamily="18" charset="0"/>
                           </a:rPr>
-                          <m:t>h</m:t>
+                          <m:t>𝒉</m:t>
                         </m:r>
                       </m:sub>
                       <m:sup>
                         <m:r>
-                          <a:rPr lang="en-IN" sz="2000" b="0" i="1" smtClean="0">
+                          <a:rPr lang="en-IN" sz="2000" b="1" i="1" smtClean="0">
                             <a:latin typeface="Cambria Math" panose="02040503050406030204" pitchFamily="18" charset="0"/>
                           </a:rPr>
-                          <m:t>2</m:t>
+                          <m:t>𝟐</m:t>
                         </m:r>
                       </m:sup>
                     </m:sSubSup>

</xml_diff>